<commit_message>
script updates to rework towards quarto
</commit_message>
<xml_diff>
--- a/__kurs_info/organisatorisches.pptx
+++ b/__kurs_info/organisatorisches.pptx
@@ -7,15 +7,16 @@
     <p:sldMasterId id="2147483659" r:id="rId3"/>
   </p:sldMasterIdLst>
   <p:notesMasterIdLst>
-    <p:notesMasterId r:id="rId10"/>
+    <p:notesMasterId r:id="rId11"/>
   </p:notesMasterIdLst>
   <p:sldIdLst>
     <p:sldId id="256" r:id="rId4"/>
     <p:sldId id="264" r:id="rId5"/>
-    <p:sldId id="265" r:id="rId6"/>
+    <p:sldId id="267" r:id="rId6"/>
     <p:sldId id="262" r:id="rId7"/>
-    <p:sldId id="263" r:id="rId8"/>
-    <p:sldId id="258" r:id="rId9"/>
+    <p:sldId id="266" r:id="rId8"/>
+    <p:sldId id="300" r:id="rId9"/>
+    <p:sldId id="265" r:id="rId10"/>
   </p:sldIdLst>
   <p:sldSz cx="12192000" cy="6858000"/>
   <p:notesSz cx="6858000" cy="9144000"/>
@@ -204,7 +205,7 @@
           <a:p>
             <a:fld id="{D0D2B97C-F126-8540-AD06-62FEF6676FCD}" type="datetimeFigureOut">
               <a:rPr lang="de-DE" smtClean="0"/>
-              <a:t>23.02.23</a:t>
+              <a:t>21.02.24</a:t>
             </a:fld>
             <a:endParaRPr lang="de-DE"/>
           </a:p>
@@ -2471,21 +2472,8 @@
                   <a:schemeClr val="bg1"/>
                 </a:solidFill>
               </a:rPr>
-              <a:t>@phish108 @</a:t>
-            </a:r>
-            <a:r>
-              <a:rPr lang="de-DE" b="1" dirty="0" err="1">
-                <a:solidFill>
-                  <a:schemeClr val="bg1"/>
-                </a:solidFill>
-              </a:rPr>
-              <a:t>datenXinfos</a:t>
-            </a:r>
-            <a:endParaRPr lang="de-DE" b="1" dirty="0">
-              <a:solidFill>
-                <a:schemeClr val="bg1"/>
-              </a:solidFill>
-            </a:endParaRPr>
+              <a:t>@phish108</a:t>
+            </a:r>
           </a:p>
         </p:txBody>
       </p:sp>
@@ -4119,7 +4107,7 @@
           <a:p>
             <a:r>
               <a:rPr lang="de-DE" sz="3600" dirty="0"/>
-              <a:t>Max. 20 Bonuspunkte für richtige Antworten im Fragen und Antwortforum bis 1.6.2023</a:t>
+              <a:t>Max. 10 Bonuspunkte für richtige Antworten im Fragen und Antwortforum bis 1.6.2023</a:t>
             </a:r>
           </a:p>
           <a:p>
@@ -4198,40 +4186,98 @@
           <a:chExt cx="0" cy="0"/>
         </a:xfrm>
       </p:grpSpPr>
-      <p:pic>
-        <p:nvPicPr>
-          <p:cNvPr id="5" name="Grafik 4">
+      <p:sp>
+        <p:nvSpPr>
+          <p:cNvPr id="3" name="Inhaltsplatzhalter 2">
             <a:extLst>
               <a:ext uri="{FF2B5EF4-FFF2-40B4-BE49-F238E27FC236}">
-                <a16:creationId xmlns:a16="http://schemas.microsoft.com/office/drawing/2014/main" id="{E22D4373-1942-6A21-47CE-675F51C8D022}"/>
+                <a16:creationId xmlns:a16="http://schemas.microsoft.com/office/drawing/2014/main" id="{540057C0-75FD-43AE-5679-597FE39DB6E2}"/>
               </a:ext>
             </a:extLst>
           </p:cNvPr>
-          <p:cNvPicPr>
-            <a:picLocks noChangeAspect="1"/>
-          </p:cNvPicPr>
-          <p:nvPr/>
-        </p:nvPicPr>
-        <p:blipFill>
-          <a:blip r:embed="rId2"/>
-          <a:stretch>
-            <a:fillRect/>
-          </a:stretch>
-        </p:blipFill>
+          <p:cNvSpPr>
+            <a:spLocks noGrp="1"/>
+          </p:cNvSpPr>
+          <p:nvPr>
+            <p:ph idx="1"/>
+          </p:nvPr>
+        </p:nvSpPr>
         <p:spPr>
           <a:xfrm>
-            <a:off x="3463608" y="0"/>
-            <a:ext cx="5264783" cy="6858000"/>
+            <a:off x="838200" y="757989"/>
+            <a:ext cx="10515600" cy="5418974"/>
           </a:xfrm>
-          <a:prstGeom prst="rect">
-            <a:avLst/>
-          </a:prstGeom>
         </p:spPr>
-      </p:pic>
+        <p:txBody>
+          <a:bodyPr anchor="ctr"/>
+          <a:lstStyle/>
+          <a:p>
+            <a:pPr marL="11112" indent="0">
+              <a:buNone/>
+            </a:pPr>
+            <a:r>
+              <a:rPr lang="de-DE" dirty="0"/>
+              <a:t>Prüfungsmodus </a:t>
+            </a:r>
+          </a:p>
+          <a:p>
+            <a:pPr marL="11112" indent="0">
+              <a:buNone/>
+            </a:pPr>
+            <a:r>
+              <a:rPr lang="de-DE" dirty="0"/>
+              <a:t>2 Stunden </a:t>
+            </a:r>
+          </a:p>
+          <a:p>
+            <a:pPr marL="11112" indent="0">
+              <a:buNone/>
+            </a:pPr>
+            <a:endParaRPr lang="de-DE" dirty="0"/>
+          </a:p>
+          <a:p>
+            <a:pPr marL="454025" indent="-442913"/>
+            <a:r>
+              <a:rPr lang="de-DE" dirty="0"/>
+              <a:t>Online </a:t>
+            </a:r>
+            <a:r>
+              <a:rPr lang="de-DE" dirty="0" err="1"/>
+              <a:t>Moodle</a:t>
+            </a:r>
+            <a:r>
+              <a:rPr lang="de-DE"/>
+              <a:t>-Prüfung</a:t>
+            </a:r>
+            <a:endParaRPr lang="de-DE" dirty="0"/>
+          </a:p>
+          <a:p>
+            <a:pPr marL="454025" indent="-442913"/>
+            <a:r>
+              <a:rPr lang="de-DE" dirty="0"/>
+              <a:t>Open Book</a:t>
+            </a:r>
+          </a:p>
+          <a:p>
+            <a:pPr marL="454025" indent="-442913"/>
+            <a:r>
+              <a:rPr lang="de-DE" dirty="0"/>
+              <a:t>Open Internet</a:t>
+            </a:r>
+          </a:p>
+          <a:p>
+            <a:pPr marL="454025" indent="-442913"/>
+            <a:r>
+              <a:rPr lang="de-DE" dirty="0"/>
+              <a:t>Unbeschränkte AI</a:t>
+            </a:r>
+          </a:p>
+        </p:txBody>
+      </p:sp>
     </p:spTree>
     <p:extLst>
       <p:ext uri="{BB962C8B-B14F-4D97-AF65-F5344CB8AC3E}">
-        <p14:creationId xmlns:p14="http://schemas.microsoft.com/office/powerpoint/2010/main" val="2182078695"/>
+        <p14:creationId xmlns:p14="http://schemas.microsoft.com/office/powerpoint/2010/main" val="1609034990"/>
       </p:ext>
     </p:extLst>
   </p:cSld>
@@ -4260,107 +4306,6 @@
       </p:grpSpPr>
       <p:pic>
         <p:nvPicPr>
-          <p:cNvPr id="1026" name="Picture 2" descr="Cover image">
-            <a:extLst>
-              <a:ext uri="{FF2B5EF4-FFF2-40B4-BE49-F238E27FC236}">
-                <a16:creationId xmlns:a16="http://schemas.microsoft.com/office/drawing/2014/main" id="{1E00FDB7-9844-7241-B00A-06F6B6BC90CC}"/>
-              </a:ext>
-            </a:extLst>
-          </p:cNvPr>
-          <p:cNvPicPr>
-            <a:picLocks noChangeAspect="1" noChangeArrowheads="1"/>
-          </p:cNvPicPr>
-          <p:nvPr/>
-        </p:nvPicPr>
-        <p:blipFill>
-          <a:blip r:embed="rId2">
-            <a:extLst>
-              <a:ext uri="{28A0092B-C50C-407E-A947-70E740481C1C}">
-                <a14:useLocalDpi xmlns:a14="http://schemas.microsoft.com/office/drawing/2010/main" val="0"/>
-              </a:ext>
-            </a:extLst>
-          </a:blip>
-          <a:srcRect/>
-          <a:stretch>
-            <a:fillRect/>
-          </a:stretch>
-        </p:blipFill>
-        <p:spPr bwMode="auto">
-          <a:xfrm>
-            <a:off x="6470904" y="964983"/>
-            <a:ext cx="3622066" cy="4760429"/>
-          </a:xfrm>
-          <a:prstGeom prst="rect">
-            <a:avLst/>
-          </a:prstGeom>
-          <a:noFill/>
-          <a:extLst>
-            <a:ext uri="{909E8E84-426E-40DD-AFC4-6F175D3DCCD1}">
-              <a14:hiddenFill xmlns:a14="http://schemas.microsoft.com/office/drawing/2010/main">
-                <a:solidFill>
-                  <a:srgbClr val="FFFFFF"/>
-                </a:solidFill>
-              </a14:hiddenFill>
-            </a:ext>
-          </a:extLst>
-        </p:spPr>
-      </p:pic>
-      <p:sp>
-        <p:nvSpPr>
-          <p:cNvPr id="4" name="Rechteck 3">
-            <a:extLst>
-              <a:ext uri="{FF2B5EF4-FFF2-40B4-BE49-F238E27FC236}">
-                <a16:creationId xmlns:a16="http://schemas.microsoft.com/office/drawing/2014/main" id="{7949E723-097B-8D41-BAC1-117FA1C7C477}"/>
-              </a:ext>
-            </a:extLst>
-          </p:cNvPr>
-          <p:cNvSpPr/>
-          <p:nvPr/>
-        </p:nvSpPr>
-        <p:spPr>
-          <a:xfrm>
-            <a:off x="6604234" y="5893017"/>
-            <a:ext cx="3355406" cy="369332"/>
-          </a:xfrm>
-          <a:prstGeom prst="rect">
-            <a:avLst/>
-          </a:prstGeom>
-        </p:spPr>
-        <p:txBody>
-          <a:bodyPr wrap="none">
-            <a:spAutoFit/>
-          </a:bodyPr>
-          <a:lstStyle/>
-          <a:p>
-            <a:r>
-              <a:rPr lang="de-DE" dirty="0">
-                <a:solidFill>
-                  <a:schemeClr val="bg1"/>
-                </a:solidFill>
-              </a:rPr>
-              <a:t>https://</a:t>
-            </a:r>
-            <a:r>
-              <a:rPr lang="de-DE" dirty="0" err="1">
-                <a:solidFill>
-                  <a:schemeClr val="bg1"/>
-                </a:solidFill>
-              </a:rPr>
-              <a:t>www.tidytextmining.com</a:t>
-            </a:r>
-            <a:r>
-              <a:rPr lang="de-DE" dirty="0">
-                <a:solidFill>
-                  <a:schemeClr val="bg1"/>
-                </a:solidFill>
-              </a:rPr>
-              <a:t>/</a:t>
-            </a:r>
-          </a:p>
-        </p:txBody>
-      </p:sp>
-      <p:pic>
-        <p:nvPicPr>
           <p:cNvPr id="2" name="Grafik 1">
             <a:extLst>
               <a:ext uri="{FF2B5EF4-FFF2-40B4-BE49-F238E27FC236}">
@@ -4374,60 +4319,21 @@
           <p:nvPr/>
         </p:nvPicPr>
         <p:blipFill>
-          <a:blip r:embed="rId3"/>
+          <a:blip r:embed="rId2"/>
           <a:stretch>
             <a:fillRect/>
           </a:stretch>
         </p:blipFill>
         <p:spPr>
           <a:xfrm>
-            <a:off x="1840972" y="964983"/>
-            <a:ext cx="3330618" cy="4760429"/>
+            <a:off x="4083575" y="552654"/>
+            <a:ext cx="4024850" cy="5752692"/>
           </a:xfrm>
           <a:prstGeom prst="rect">
             <a:avLst/>
           </a:prstGeom>
         </p:spPr>
       </p:pic>
-      <p:sp>
-        <p:nvSpPr>
-          <p:cNvPr id="5" name="Rechteck 4">
-            <a:extLst>
-              <a:ext uri="{FF2B5EF4-FFF2-40B4-BE49-F238E27FC236}">
-                <a16:creationId xmlns:a16="http://schemas.microsoft.com/office/drawing/2014/main" id="{F62886BF-D73A-76F7-EA9C-AA3572C4A66B}"/>
-              </a:ext>
-            </a:extLst>
-          </p:cNvPr>
-          <p:cNvSpPr/>
-          <p:nvPr/>
-        </p:nvSpPr>
-        <p:spPr>
-          <a:xfrm>
-            <a:off x="6604234" y="6245288"/>
-            <a:ext cx="3355406" cy="369332"/>
-          </a:xfrm>
-          <a:prstGeom prst="rect">
-            <a:avLst/>
-          </a:prstGeom>
-        </p:spPr>
-        <p:txBody>
-          <a:bodyPr wrap="square">
-            <a:spAutoFit/>
-          </a:bodyPr>
-          <a:lstStyle/>
-          <a:p>
-            <a:pPr algn="ctr"/>
-            <a:r>
-              <a:rPr lang="de-DE" dirty="0">
-                <a:solidFill>
-                  <a:schemeClr val="bg1"/>
-                </a:solidFill>
-              </a:rPr>
-              <a:t>Kapitel 1</a:t>
-            </a:r>
-          </a:p>
-        </p:txBody>
-      </p:sp>
     </p:spTree>
     <p:extLst>
       <p:ext uri="{BB962C8B-B14F-4D97-AF65-F5344CB8AC3E}">
@@ -4460,10 +4366,10 @@
       </p:grpSpPr>
       <p:pic>
         <p:nvPicPr>
-          <p:cNvPr id="3" name="Grafik 2">
+          <p:cNvPr id="4" name="Grafik 3">
             <a:extLst>
               <a:ext uri="{FF2B5EF4-FFF2-40B4-BE49-F238E27FC236}">
-                <a16:creationId xmlns:a16="http://schemas.microsoft.com/office/drawing/2014/main" id="{5B6FA233-7908-914D-B9E6-0596807EED08}"/>
+                <a16:creationId xmlns:a16="http://schemas.microsoft.com/office/drawing/2014/main" id="{6617EE8D-D4EB-BCA0-CBC6-416CFE215A80}"/>
               </a:ext>
             </a:extLst>
           </p:cNvPr>
@@ -4473,15 +4379,21 @@
           <p:nvPr/>
         </p:nvPicPr>
         <p:blipFill>
-          <a:blip r:embed="rId2"/>
+          <a:blip r:embed="rId2">
+            <a:extLst>
+              <a:ext uri="{96DAC541-7B7A-43D3-8B79-37D633B846F1}">
+                <asvg:svgBlip xmlns:asvg="http://schemas.microsoft.com/office/drawing/2016/SVG/main" r:embed="rId3"/>
+              </a:ext>
+            </a:extLst>
+          </a:blip>
           <a:stretch>
             <a:fillRect/>
           </a:stretch>
         </p:blipFill>
         <p:spPr>
           <a:xfrm>
-            <a:off x="6896171" y="1457853"/>
-            <a:ext cx="2514600" cy="3594100"/>
+            <a:off x="3135086" y="787825"/>
+            <a:ext cx="4836606" cy="4498580"/>
           </a:xfrm>
           <a:prstGeom prst="rect">
             <a:avLst/>
@@ -4490,10 +4402,10 @@
       </p:pic>
       <p:pic>
         <p:nvPicPr>
-          <p:cNvPr id="7" name="Grafik 6">
+          <p:cNvPr id="6" name="Grafik 5">
             <a:extLst>
               <a:ext uri="{FF2B5EF4-FFF2-40B4-BE49-F238E27FC236}">
-                <a16:creationId xmlns:a16="http://schemas.microsoft.com/office/drawing/2014/main" id="{7B33A31E-F13A-3C47-98A7-B4777394D9C2}"/>
+                <a16:creationId xmlns:a16="http://schemas.microsoft.com/office/drawing/2014/main" id="{EBFA2201-4BC7-42EB-D8B3-45C634233B94}"/>
               </a:ext>
             </a:extLst>
           </p:cNvPr>
@@ -4503,15 +4415,21 @@
           <p:nvPr/>
         </p:nvPicPr>
         <p:blipFill>
-          <a:blip r:embed="rId3"/>
+          <a:blip r:embed="rId4">
+            <a:extLst>
+              <a:ext uri="{96DAC541-7B7A-43D3-8B79-37D633B846F1}">
+                <asvg:svgBlip xmlns:asvg="http://schemas.microsoft.com/office/drawing/2016/SVG/main" r:embed="rId5"/>
+              </a:ext>
+            </a:extLst>
+          </a:blip>
           <a:stretch>
             <a:fillRect/>
           </a:stretch>
         </p:blipFill>
         <p:spPr>
           <a:xfrm>
-            <a:off x="2927046" y="1457851"/>
-            <a:ext cx="2514600" cy="3594100"/>
+            <a:off x="7562239" y="3949003"/>
+            <a:ext cx="2608228" cy="2430026"/>
           </a:xfrm>
           <a:prstGeom prst="rect">
             <a:avLst/>
@@ -4521,7 +4439,7 @@
     </p:spTree>
     <p:extLst>
       <p:ext uri="{BB962C8B-B14F-4D97-AF65-F5344CB8AC3E}">
-        <p14:creationId xmlns:p14="http://schemas.microsoft.com/office/powerpoint/2010/main" val="2623727372"/>
+        <p14:creationId xmlns:p14="http://schemas.microsoft.com/office/powerpoint/2010/main" val="2184792318"/>
       </p:ext>
     </p:extLst>
   </p:cSld>
@@ -4548,12 +4466,177 @@
           <a:chExt cx="0" cy="0"/>
         </a:xfrm>
       </p:grpSpPr>
+      <p:sp>
+        <p:nvSpPr>
+          <p:cNvPr id="4" name="Textfeld 3">
+            <a:extLst>
+              <a:ext uri="{FF2B5EF4-FFF2-40B4-BE49-F238E27FC236}">
+                <a16:creationId xmlns:a16="http://schemas.microsoft.com/office/drawing/2014/main" id="{4F659550-D4E6-9DF8-D839-EB7C24AFB303}"/>
+              </a:ext>
+            </a:extLst>
+          </p:cNvPr>
+          <p:cNvSpPr txBox="1"/>
+          <p:nvPr/>
+        </p:nvSpPr>
+        <p:spPr>
+          <a:xfrm>
+            <a:off x="8407730" y="6341423"/>
+            <a:ext cx="2288640" cy="369332"/>
+          </a:xfrm>
+          <a:prstGeom prst="rect">
+            <a:avLst/>
+          </a:prstGeom>
+          <a:noFill/>
+        </p:spPr>
+        <p:txBody>
+          <a:bodyPr wrap="none" rtlCol="0">
+            <a:spAutoFit/>
+          </a:bodyPr>
+          <a:lstStyle/>
+          <a:p>
+            <a:r>
+              <a:rPr lang="de-DE" dirty="0">
+                <a:solidFill>
+                  <a:srgbClr val="FFC000"/>
+                </a:solidFill>
+              </a:rPr>
+              <a:t>Saunders (2007, 2011)</a:t>
+            </a:r>
+          </a:p>
+        </p:txBody>
+      </p:sp>
+      <p:pic>
+        <p:nvPicPr>
+          <p:cNvPr id="1028" name="Picture 4" descr="The research 'onion' research design Source: Adopted from Saunders et al., (2007)">
+            <a:extLst>
+              <a:ext uri="{FF2B5EF4-FFF2-40B4-BE49-F238E27FC236}">
+                <a16:creationId xmlns:a16="http://schemas.microsoft.com/office/drawing/2014/main" id="{F4F05E23-21B3-F8AE-00DE-E36CD592C40C}"/>
+              </a:ext>
+            </a:extLst>
+          </p:cNvPr>
+          <p:cNvPicPr>
+            <a:picLocks noChangeAspect="1" noChangeArrowheads="1"/>
+          </p:cNvPicPr>
+          <p:nvPr/>
+        </p:nvPicPr>
+        <p:blipFill>
+          <a:blip r:embed="rId2">
+            <a:extLst>
+              <a:ext uri="{28A0092B-C50C-407E-A947-70E740481C1C}">
+                <a14:useLocalDpi xmlns:a14="http://schemas.microsoft.com/office/drawing/2010/main" val="0"/>
+              </a:ext>
+            </a:extLst>
+          </a:blip>
+          <a:srcRect/>
+          <a:stretch>
+            <a:fillRect/>
+          </a:stretch>
+        </p:blipFill>
+        <p:spPr bwMode="auto">
+          <a:xfrm>
+            <a:off x="1409700" y="869950"/>
+            <a:ext cx="9372600" cy="5118100"/>
+          </a:xfrm>
+          <a:prstGeom prst="rect">
+            <a:avLst/>
+          </a:prstGeom>
+          <a:noFill/>
+          <a:extLst>
+            <a:ext uri="{909E8E84-426E-40DD-AFC4-6F175D3DCCD1}">
+              <a14:hiddenFill xmlns:a14="http://schemas.microsoft.com/office/drawing/2010/main">
+                <a:solidFill>
+                  <a:srgbClr val="FFFFFF"/>
+                </a:solidFill>
+              </a14:hiddenFill>
+            </a:ext>
+          </a:extLst>
+        </p:spPr>
+      </p:pic>
+    </p:spTree>
+    <p:extLst>
+      <p:ext uri="{BB962C8B-B14F-4D97-AF65-F5344CB8AC3E}">
+        <p14:creationId xmlns:p14="http://schemas.microsoft.com/office/powerpoint/2010/main" val="2798032335"/>
+      </p:ext>
+    </p:extLst>
+  </p:cSld>
+  <p:clrMapOvr>
+    <a:masterClrMapping/>
+  </p:clrMapOvr>
+</p:sld>
+</file>
+
+<file path=ppt/slides/slide7.xml><?xml version="1.0" encoding="utf-8"?>
+<p:sld xmlns:a="http://schemas.openxmlformats.org/drawingml/2006/main" xmlns:r="http://schemas.openxmlformats.org/officeDocument/2006/relationships" xmlns:p="http://schemas.openxmlformats.org/presentationml/2006/main">
+  <p:cSld>
+    <p:spTree>
+      <p:nvGrpSpPr>
+        <p:cNvPr id="1" name=""/>
+        <p:cNvGrpSpPr/>
+        <p:nvPr/>
+      </p:nvGrpSpPr>
+      <p:grpSpPr>
+        <a:xfrm>
+          <a:off x="0" y="0"/>
+          <a:ext cx="0" cy="0"/>
+          <a:chOff x="0" y="0"/>
+          <a:chExt cx="0" cy="0"/>
+        </a:xfrm>
+      </p:grpSpPr>
+      <p:sp>
+        <p:nvSpPr>
+          <p:cNvPr id="3" name="Rechteck 2">
+            <a:extLst>
+              <a:ext uri="{FF2B5EF4-FFF2-40B4-BE49-F238E27FC236}">
+                <a16:creationId xmlns:a16="http://schemas.microsoft.com/office/drawing/2014/main" id="{2A9E0A0C-696A-361F-AF26-C1512EAAC080}"/>
+              </a:ext>
+            </a:extLst>
+          </p:cNvPr>
+          <p:cNvSpPr/>
+          <p:nvPr/>
+        </p:nvSpPr>
+        <p:spPr>
+          <a:xfrm>
+            <a:off x="3265714" y="0"/>
+            <a:ext cx="5569527" cy="6858000"/>
+          </a:xfrm>
+          <a:prstGeom prst="rect">
+            <a:avLst/>
+          </a:prstGeom>
+          <a:solidFill>
+            <a:schemeClr val="bg1"/>
+          </a:solidFill>
+        </p:spPr>
+        <p:style>
+          <a:lnRef idx="2">
+            <a:schemeClr val="accent1">
+              <a:shade val="15000"/>
+            </a:schemeClr>
+          </a:lnRef>
+          <a:fillRef idx="1">
+            <a:schemeClr val="accent1"/>
+          </a:fillRef>
+          <a:effectRef idx="0">
+            <a:schemeClr val="accent1"/>
+          </a:effectRef>
+          <a:fontRef idx="minor">
+            <a:schemeClr val="lt1"/>
+          </a:fontRef>
+        </p:style>
+        <p:txBody>
+          <a:bodyPr rtlCol="0" anchor="ctr"/>
+          <a:lstStyle/>
+          <a:p>
+            <a:pPr algn="ctr"/>
+            <a:endParaRPr lang="de-DE" dirty="0"/>
+          </a:p>
+        </p:txBody>
+      </p:sp>
       <p:pic>
         <p:nvPicPr>
           <p:cNvPr id="4" name="Grafik 3">
             <a:extLst>
               <a:ext uri="{FF2B5EF4-FFF2-40B4-BE49-F238E27FC236}">
-                <a16:creationId xmlns:a16="http://schemas.microsoft.com/office/drawing/2014/main" id="{E9B5EE88-D9ED-E94B-8388-D294C8E6E8B7}"/>
+                <a16:creationId xmlns:a16="http://schemas.microsoft.com/office/drawing/2014/main" id="{72BF69D6-DB27-C456-6075-E7D30BB397FC}"/>
               </a:ext>
             </a:extLst>
           </p:cNvPr>
@@ -4563,107 +4646,31 @@
           <p:nvPr/>
         </p:nvPicPr>
         <p:blipFill>
-          <a:blip r:embed="rId2"/>
+          <a:blip r:embed="rId2">
+            <a:extLst>
+              <a:ext uri="{96DAC541-7B7A-43D3-8B79-37D633B846F1}">
+                <asvg:svgBlip xmlns:asvg="http://schemas.microsoft.com/office/drawing/2016/SVG/main" r:embed="rId3"/>
+              </a:ext>
+            </a:extLst>
+          </a:blip>
           <a:stretch>
             <a:fillRect/>
           </a:stretch>
         </p:blipFill>
         <p:spPr>
           <a:xfrm>
-            <a:off x="3462792" y="594279"/>
-            <a:ext cx="5266415" cy="5243814"/>
+            <a:off x="3446189" y="0"/>
+            <a:ext cx="6743815" cy="6858000"/>
           </a:xfrm>
           <a:prstGeom prst="rect">
             <a:avLst/>
           </a:prstGeom>
         </p:spPr>
       </p:pic>
-      <p:sp>
-        <p:nvSpPr>
-          <p:cNvPr id="2" name="Rechteck 1">
-            <a:extLst>
-              <a:ext uri="{FF2B5EF4-FFF2-40B4-BE49-F238E27FC236}">
-                <a16:creationId xmlns:a16="http://schemas.microsoft.com/office/drawing/2014/main" id="{08A1E09A-8CBE-CC44-9F80-F9491AE616FF}"/>
-              </a:ext>
-            </a:extLst>
-          </p:cNvPr>
-          <p:cNvSpPr/>
-          <p:nvPr/>
-        </p:nvSpPr>
-        <p:spPr>
-          <a:xfrm>
-            <a:off x="3656805" y="5838093"/>
-            <a:ext cx="4878387" cy="523220"/>
-          </a:xfrm>
-          <a:prstGeom prst="rect">
-            <a:avLst/>
-          </a:prstGeom>
-        </p:spPr>
-        <p:txBody>
-          <a:bodyPr wrap="none">
-            <a:spAutoFit/>
-          </a:bodyPr>
-          <a:lstStyle/>
-          <a:p>
-            <a:r>
-              <a:rPr lang="de-CH" sz="2800" b="1" dirty="0">
-                <a:solidFill>
-                  <a:srgbClr val="FFFFFF"/>
-                </a:solidFill>
-                <a:effectLst/>
-                <a:latin typeface="Arial Black" panose="020B0604020202020204" pitchFamily="34" charset="0"/>
-                <a:cs typeface="Arial Black" panose="020B0604020202020204" pitchFamily="34" charset="0"/>
-              </a:rPr>
-              <a:t>https://</a:t>
-            </a:r>
-            <a:r>
-              <a:rPr lang="de-CH" sz="2800" b="1" dirty="0" err="1">
-                <a:solidFill>
-                  <a:srgbClr val="FFFFFF"/>
-                </a:solidFill>
-                <a:effectLst/>
-                <a:latin typeface="Arial Black" panose="020B0604020202020204" pitchFamily="34" charset="0"/>
-                <a:cs typeface="Arial Black" panose="020B0604020202020204" pitchFamily="34" charset="0"/>
-              </a:rPr>
-              <a:t>www.zhaw.ch</a:t>
-            </a:r>
-            <a:r>
-              <a:rPr lang="de-CH" sz="2800" b="1" dirty="0">
-                <a:solidFill>
-                  <a:srgbClr val="FFFFFF"/>
-                </a:solidFill>
-                <a:effectLst/>
-                <a:latin typeface="Arial Black" panose="020B0604020202020204" pitchFamily="34" charset="0"/>
-                <a:cs typeface="Arial Black" panose="020B0604020202020204" pitchFamily="34" charset="0"/>
-              </a:rPr>
-              <a:t>/</a:t>
-            </a:r>
-            <a:r>
-              <a:rPr lang="de-CH" sz="2800" b="1" dirty="0" err="1">
-                <a:solidFill>
-                  <a:srgbClr val="FFFFFF"/>
-                </a:solidFill>
-                <a:effectLst/>
-                <a:latin typeface="Arial Black" panose="020B0604020202020204" pitchFamily="34" charset="0"/>
-                <a:cs typeface="Arial Black" panose="020B0604020202020204" pitchFamily="34" charset="0"/>
-              </a:rPr>
-              <a:t>ias</a:t>
-            </a:r>
-            <a:endParaRPr lang="de-CH" sz="2800" b="1" dirty="0">
-              <a:solidFill>
-                <a:srgbClr val="FFFFFF"/>
-              </a:solidFill>
-              <a:effectLst/>
-              <a:latin typeface="Arial Black" panose="020B0604020202020204" pitchFamily="34" charset="0"/>
-              <a:cs typeface="Arial Black" panose="020B0604020202020204" pitchFamily="34" charset="0"/>
-            </a:endParaRPr>
-          </a:p>
-        </p:txBody>
-      </p:sp>
     </p:spTree>
     <p:extLst>
       <p:ext uri="{BB962C8B-B14F-4D97-AF65-F5344CB8AC3E}">
-        <p14:creationId xmlns:p14="http://schemas.microsoft.com/office/powerpoint/2010/main" val="3502546353"/>
+        <p14:creationId xmlns:p14="http://schemas.microsoft.com/office/powerpoint/2010/main" val="2182078695"/>
       </p:ext>
     </p:extLst>
   </p:cSld>

</xml_diff>